<commit_message>
add new parts in ppt
</commit_message>
<xml_diff>
--- a/DR_AI_FinalProject_v1.1.pptx
+++ b/DR_AI_FinalProject_v1.1.pptx
@@ -1050,6 +1050,88 @@
               <a:buNone/>
             </a:pPr>
             <a:r>
+              <a:rPr lang="en-US"/>
+              <a:t>LSTM - </a:t>
+            </a:r>
+            <a:endParaRPr/>
+          </a:p>
+          <a:p>
+            <a:pPr indent="0" lvl="0" marL="0" rtl="0" algn="l">
+              <a:lnSpc>
+                <a:spcPct val="100000"/>
+              </a:lnSpc>
+              <a:spcBef>
+                <a:spcPts val="0"/>
+              </a:spcBef>
+              <a:spcAft>
+                <a:spcPts val="0"/>
+              </a:spcAft>
+              <a:buSzPts val="1100"/>
+              <a:buNone/>
+            </a:pPr>
+            <a:r>
+              <a:t/>
+            </a:r>
+            <a:endParaRPr b="1"/>
+          </a:p>
+          <a:p>
+            <a:pPr indent="0" lvl="0" marL="0" rtl="0" algn="l">
+              <a:lnSpc>
+                <a:spcPct val="100000"/>
+              </a:lnSpc>
+              <a:spcBef>
+                <a:spcPts val="0"/>
+              </a:spcBef>
+              <a:spcAft>
+                <a:spcPts val="0"/>
+              </a:spcAft>
+              <a:buSzPts val="1100"/>
+              <a:buNone/>
+            </a:pPr>
+            <a:r>
+              <a:rPr b="1" lang="en-US"/>
+              <a:t>R-squared (R2) - 0.7998: </a:t>
+            </a:r>
+            <a:r>
+              <a:rPr lang="en-US"/>
+              <a:t>An R2 score of nearly 0.80 is quite high for financial time series prediction, indicating that about 80% of the variance in the actual volatility is explained by the model.</a:t>
+            </a:r>
+            <a:endParaRPr/>
+          </a:p>
+          <a:p>
+            <a:pPr indent="0" lvl="0" marL="0" rtl="0" algn="l">
+              <a:lnSpc>
+                <a:spcPct val="100000"/>
+              </a:lnSpc>
+              <a:spcBef>
+                <a:spcPts val="0"/>
+              </a:spcBef>
+              <a:spcAft>
+                <a:spcPts val="0"/>
+              </a:spcAft>
+              <a:buSzPts val="1100"/>
+              <a:buNone/>
+            </a:pPr>
+            <a:r>
+              <a:t/>
+            </a:r>
+            <a:endParaRPr/>
+          </a:p>
+          <a:p>
+            <a:pPr indent="0" lvl="0" marL="0" rtl="0" algn="l">
+              <a:lnSpc>
+                <a:spcPct val="100000"/>
+              </a:lnSpc>
+              <a:spcBef>
+                <a:spcPts val="0"/>
+              </a:spcBef>
+              <a:spcAft>
+                <a:spcPts val="0"/>
+              </a:spcAft>
+              <a:buSzPts val="1100"/>
+              <a:buNone/>
+            </a:pPr>
+            <a:r>
               <a:t/>
             </a:r>
             <a:endParaRPr/>
@@ -2085,6 +2167,66 @@
               <a:buNone/>
             </a:pPr>
             <a:r>
+              <a:rPr lang="en-US"/>
+              <a:t>Capture the general trend of the actual volatility, but there are noticeable deviations, particularly in capturing the peak values.</a:t>
+            </a:r>
+            <a:endParaRPr/>
+          </a:p>
+          <a:p>
+            <a:pPr indent="0" lvl="0" marL="0" rtl="0" algn="l">
+              <a:lnSpc>
+                <a:spcPct val="100000"/>
+              </a:lnSpc>
+              <a:spcBef>
+                <a:spcPts val="0"/>
+              </a:spcBef>
+              <a:spcAft>
+                <a:spcPts val="0"/>
+              </a:spcAft>
+              <a:buSzPts val="1100"/>
+              <a:buNone/>
+            </a:pPr>
+            <a:r>
+              <a:rPr lang="en-US"/>
+              <a:t>The model tends to underpredict the highest volatility spikes, which are critical events in financial markets.</a:t>
+            </a:r>
+            <a:endParaRPr/>
+          </a:p>
+          <a:p>
+            <a:pPr indent="0" lvl="0" marL="0" rtl="0" algn="l">
+              <a:lnSpc>
+                <a:spcPct val="100000"/>
+              </a:lnSpc>
+              <a:spcBef>
+                <a:spcPts val="0"/>
+              </a:spcBef>
+              <a:spcAft>
+                <a:spcPts val="0"/>
+              </a:spcAft>
+              <a:buSzPts val="1100"/>
+              <a:buNone/>
+            </a:pPr>
+            <a:r>
+              <a:rPr lang="en-US"/>
+              <a:t>After the peak in early 2020, which likely corresponds to the market reaction to the COVID-19 pandemic, both the actual and predicted volatility values trend downward, with the predicted values closely following the actual trend but with some lag and less pronounced movements</a:t>
+            </a:r>
+            <a:endParaRPr/>
+          </a:p>
+          <a:p>
+            <a:pPr indent="0" lvl="0" marL="0" rtl="0" algn="l">
+              <a:lnSpc>
+                <a:spcPct val="100000"/>
+              </a:lnSpc>
+              <a:spcBef>
+                <a:spcPts val="0"/>
+              </a:spcBef>
+              <a:spcAft>
+                <a:spcPts val="0"/>
+              </a:spcAft>
+              <a:buSzPts val="1100"/>
+              <a:buNone/>
+            </a:pPr>
+            <a:r>
               <a:t/>
             </a:r>
             <a:endParaRPr/>
@@ -2187,6 +2329,65 @@
             <a:noAutofit/>
           </a:bodyPr>
           <a:lstStyle/>
+          <a:p>
+            <a:pPr indent="0" lvl="0" marL="0" rtl="0" algn="l">
+              <a:lnSpc>
+                <a:spcPct val="100000"/>
+              </a:lnSpc>
+              <a:spcBef>
+                <a:spcPts val="0"/>
+              </a:spcBef>
+              <a:spcAft>
+                <a:spcPts val="0"/>
+              </a:spcAft>
+              <a:buSzPts val="1100"/>
+              <a:buNone/>
+            </a:pPr>
+            <a:r>
+              <a:t/>
+            </a:r>
+            <a:endParaRPr/>
+          </a:p>
+          <a:p>
+            <a:pPr indent="0" lvl="0" marL="0" rtl="0" algn="l">
+              <a:lnSpc>
+                <a:spcPct val="100000"/>
+              </a:lnSpc>
+              <a:spcBef>
+                <a:spcPts val="0"/>
+              </a:spcBef>
+              <a:spcAft>
+                <a:spcPts val="0"/>
+              </a:spcAft>
+              <a:buSzPts val="1100"/>
+              <a:buNone/>
+            </a:pPr>
+            <a:r>
+              <a:rPr lang="en-US"/>
+              <a:t>There are  noticeable periods where the model's predictions diverge from the actual values. This is particularly evident around the peak, where the model does not capture the sharp rise and subsequent fall in volatility.</a:t>
+            </a:r>
+            <a:endParaRPr/>
+          </a:p>
+          <a:p>
+            <a:pPr indent="0" lvl="0" marL="0" rtl="0" algn="l">
+              <a:lnSpc>
+                <a:spcPct val="100000"/>
+              </a:lnSpc>
+              <a:spcBef>
+                <a:spcPts val="0"/>
+              </a:spcBef>
+              <a:spcAft>
+                <a:spcPts val="0"/>
+              </a:spcAft>
+              <a:buSzPts val="1100"/>
+              <a:buNone/>
+            </a:pPr>
+            <a:r>
+              <a:rPr lang="en-US"/>
+              <a:t>Post the peak period, the predicted values tend to follow the actual trend but do not capture the finer fluctuations accurately. This could indicate that the model may be smoothing over some of the volatility.</a:t>
+            </a:r>
+            <a:endParaRPr/>
+          </a:p>
           <a:p>
             <a:pPr indent="0" lvl="0" marL="0" rtl="0" algn="l">
               <a:lnSpc>
@@ -15935,7 +16136,7 @@
             <a:tbl>
               <a:tblPr firstRow="1">
                 <a:noFill/>
-                <a:tableStyleId>{30360790-5289-4B7C-9E63-0BB35E212C12}</a:tableStyleId>
+                <a:tableStyleId>{14E7404F-3917-482B-A5BB-7AFAE022C1BA}</a:tableStyleId>
               </a:tblPr>
               <a:tblGrid>
                 <a:gridCol w="2162800"/>
@@ -16270,7 +16471,11 @@
                       </a:pPr>
                       <a:r>
                         <a:rPr lang="en-US" sz="1800" u="none" cap="none" strike="noStrike"/>
-                        <a:t>0.0272</a:t>
+                        <a:t>0.0</a:t>
+                      </a:r>
+                      <a:r>
+                        <a:rPr lang="en-US" sz="1800"/>
+                        <a:t>827</a:t>
                       </a:r>
                       <a:endParaRPr sz="1800" u="none" cap="none" strike="noStrike"/>
                     </a:p>
@@ -16431,7 +16636,11 @@
                       </a:pPr>
                       <a:r>
                         <a:rPr lang="en-US" sz="1800" u="none" cap="none" strike="noStrike"/>
-                        <a:t>0.1648</a:t>
+                        <a:t>0.</a:t>
+                      </a:r>
+                      <a:r>
+                        <a:rPr lang="en-US" sz="1800"/>
+                        <a:t>0272</a:t>
                       </a:r>
                       <a:endParaRPr sz="1800" u="none" cap="none" strike="noStrike"/>
                     </a:p>
@@ -16588,7 +16797,11 @@
                       </a:pPr>
                       <a:r>
                         <a:rPr lang="en-US" sz="1800" u="none" cap="none" strike="noStrike"/>
-                        <a:t>0.0827</a:t>
+                        <a:t>0.</a:t>
+                      </a:r>
+                      <a:r>
+                        <a:rPr lang="en-US" sz="1800"/>
+                        <a:t>1648</a:t>
                       </a:r>
                       <a:endParaRPr sz="1800" u="none" cap="none" strike="noStrike"/>
                     </a:p>
@@ -17437,7 +17650,7 @@
                 <a:cs typeface="Arial"/>
                 <a:sym typeface="Arial"/>
               </a:rPr>
-              <a:t>LSTM (Long Short-Term Memory) Model</a:t>
+              <a:t>LSTM Model</a:t>
             </a:r>
             <a:r>
               <a:rPr lang="en-US" sz="1800">
@@ -17452,6 +17665,42 @@
               <a:t>: The LSTM model showed the best performance with the lowest MAE, MSE, and RMSE, and the highest R-squared value. </a:t>
             </a:r>
             <a:endParaRPr/>
+          </a:p>
+          <a:p>
+            <a:pPr indent="-314325" lvl="0" marL="457200" rtl="0" algn="l">
+              <a:lnSpc>
+                <a:spcPct val="150000"/>
+              </a:lnSpc>
+              <a:spcBef>
+                <a:spcPts val="0"/>
+              </a:spcBef>
+              <a:spcAft>
+                <a:spcPts val="0"/>
+              </a:spcAft>
+              <a:buSzPts val="1350"/>
+              <a:buAutoNum type="arabicPeriod"/>
+            </a:pPr>
+            <a:r>
+              <a:rPr b="1" lang="en-US" sz="1800">
+                <a:highlight>
+                  <a:schemeClr val="lt1"/>
+                </a:highlight>
+              </a:rPr>
+              <a:t>Prophet Model</a:t>
+            </a:r>
+            <a:r>
+              <a:rPr lang="en-US" sz="1800">
+                <a:highlight>
+                  <a:schemeClr val="lt1"/>
+                </a:highlight>
+              </a:rPr>
+              <a:t>: The Prophet model did not perform as well as the LSTM, with all error metrics being higher and an R-squared value significantly lower, but better than other models. . </a:t>
+            </a:r>
+            <a:endParaRPr b="1" sz="1800">
+              <a:highlight>
+                <a:srgbClr val="FFFFFF"/>
+              </a:highlight>
+            </a:endParaRPr>
           </a:p>
           <a:p>
             <a:pPr indent="-314325" lvl="0" marL="457200" rtl="0" algn="l">
@@ -17489,35 +17738,7 @@
                 <a:cs typeface="Arial"/>
                 <a:sym typeface="Arial"/>
               </a:rPr>
-              <a:t>: The model has performed better than the Prophet and XGBoost models in terms of MSE and RMSE but worse than the LSTM model. Its R-squared value is also lower than the LSTM's but higher than that of the XGBoost model.</a:t>
-            </a:r>
-            <a:endParaRPr/>
-          </a:p>
-          <a:p>
-            <a:pPr indent="-314325" lvl="0" marL="457200" rtl="0" algn="l">
-              <a:lnSpc>
-                <a:spcPct val="150000"/>
-              </a:lnSpc>
-              <a:spcBef>
-                <a:spcPts val="0"/>
-              </a:spcBef>
-              <a:spcAft>
-                <a:spcPts val="0"/>
-              </a:spcAft>
-              <a:buSzPts val="1350"/>
-              <a:buAutoNum type="arabicPeriod"/>
-            </a:pPr>
-            <a:r>
-              <a:rPr b="1" lang="en-US" sz="1800">
-                <a:highlight>
-                  <a:srgbClr val="FFFFFF"/>
-                </a:highlight>
-                <a:latin typeface="Arial"/>
-                <a:ea typeface="Arial"/>
-                <a:cs typeface="Arial"/>
-                <a:sym typeface="Arial"/>
-              </a:rPr>
-              <a:t>Prophet Model</a:t>
+              <a:t>: The model has performed better than XGBoost models in terms of </a:t>
             </a:r>
             <a:r>
               <a:rPr lang="en-US" sz="1800">
@@ -17529,7 +17750,43 @@
                 <a:cs typeface="Arial"/>
                 <a:sym typeface="Arial"/>
               </a:rPr>
-              <a:t>: The Prophet model did not perform as well as the LSTM, with all error metrics being higher and an R-squared value significantly lower. </a:t>
+              <a:t>MSE and RMSE</a:t>
+            </a:r>
+            <a:r>
+              <a:rPr lang="en-US" sz="1800">
+                <a:highlight>
+                  <a:srgbClr val="FFFFFF"/>
+                </a:highlight>
+                <a:latin typeface="Arial"/>
+                <a:ea typeface="Arial"/>
+                <a:cs typeface="Arial"/>
+                <a:sym typeface="Arial"/>
+              </a:rPr>
+              <a:t> but worse than the LSTM model. Its R-squared value is also lower than the LSTM</a:t>
+            </a:r>
+            <a:r>
+              <a:rPr lang="en-US" sz="1800">
+                <a:highlight>
+                  <a:srgbClr val="FFFFFF"/>
+                </a:highlight>
+                <a:latin typeface="Arial"/>
+                <a:ea typeface="Arial"/>
+                <a:cs typeface="Arial"/>
+                <a:sym typeface="Arial"/>
+              </a:rPr>
+              <a:t> </a:t>
+            </a:r>
+            <a:r>
+              <a:rPr lang="en-US" sz="1800">
+                <a:highlight>
+                  <a:srgbClr val="FFFFFF"/>
+                </a:highlight>
+                <a:latin typeface="Arial"/>
+                <a:ea typeface="Arial"/>
+                <a:cs typeface="Arial"/>
+                <a:sym typeface="Arial"/>
+              </a:rPr>
+              <a:t>but higher than that of the XGBoost model.</a:t>
             </a:r>
             <a:endParaRPr/>
           </a:p>
@@ -18107,7 +18364,7 @@
             <a:tbl>
               <a:tblPr bandRow="1" firstRow="1">
                 <a:noFill/>
-                <a:tableStyleId>{30360790-5289-4B7C-9E63-0BB35E212C12}</a:tableStyleId>
+                <a:tableStyleId>{14E7404F-3917-482B-A5BB-7AFAE022C1BA}</a:tableStyleId>
               </a:tblPr>
               <a:tblGrid>
                 <a:gridCol w="3845600"/>
@@ -19783,7 +20040,7 @@
                 <a:cs typeface="Calibri"/>
                 <a:sym typeface="Calibri"/>
               </a:rPr>
-              <a:t>Top15 correlated</a:t>
+              <a:t>Top 15 correlated</a:t>
             </a:r>
             <a:endParaRPr i="1" sz="1500">
               <a:solidFill>
@@ -20784,44 +21041,68 @@
           </a:ln>
         </p:spPr>
         <p:txBody>
-          <a:bodyPr anchorCtr="0" anchor="t" bIns="45700" lIns="91425" spcFirstLastPara="1" rIns="91425" wrap="square" tIns="45700">
-            <a:normAutofit fontScale="92500"/>
+          <a:bodyPr anchorCtr="0" anchor="ctr" bIns="45700" lIns="91425" spcFirstLastPara="1" rIns="91425" wrap="square" tIns="45700">
+            <a:normAutofit/>
           </a:bodyPr>
           <a:lstStyle/>
           <a:p>
-            <a:pPr indent="-295275" lvl="0" marL="457200" rtl="0" algn="l">
+            <a:pPr indent="-349250" lvl="0" marL="457200" rtl="0" algn="l">
               <a:lnSpc>
                 <a:spcPct val="150000"/>
               </a:lnSpc>
               <a:spcBef>
-                <a:spcPts val="1100"/>
-              </a:spcBef>
-              <a:spcAft>
-                <a:spcPts val="0"/>
-              </a:spcAft>
-              <a:buSzPct val="70945"/>
+                <a:spcPts val="0"/>
+              </a:spcBef>
+              <a:spcAft>
+                <a:spcPts val="0"/>
+              </a:spcAft>
+              <a:buSzPts val="1900"/>
               <a:buChar char="●"/>
             </a:pPr>
             <a:r>
-              <a:rPr lang="en-US" sz="1600">
+              <a:rPr lang="en-US" sz="1900">
                 <a:highlight>
                   <a:srgbClr val="FFFFFF"/>
                 </a:highlight>
               </a:rPr>
-              <a:t>Capture the general trend of the actual volatility, but there are noticeable deviations, </a:t>
+              <a:t>Trend - Good</a:t>
             </a:r>
+            <a:endParaRPr sz="1900">
+              <a:highlight>
+                <a:srgbClr val="FFFFFF"/>
+              </a:highlight>
+            </a:endParaRPr>
+          </a:p>
+          <a:p>
+            <a:pPr indent="-349250" lvl="0" marL="457200" rtl="0" algn="l">
+              <a:lnSpc>
+                <a:spcPct val="150000"/>
+              </a:lnSpc>
+              <a:spcBef>
+                <a:spcPts val="0"/>
+              </a:spcBef>
+              <a:spcAft>
+                <a:spcPts val="0"/>
+              </a:spcAft>
+              <a:buSzPts val="1900"/>
+              <a:buChar char="●"/>
+            </a:pPr>
             <a:r>
-              <a:rPr b="1" lang="en-US" sz="1600">
+              <a:rPr lang="en-US" sz="1900">
                 <a:highlight>
                   <a:srgbClr val="FFFFFF"/>
                 </a:highlight>
               </a:rPr>
-              <a:t>particularly in capturing the peak values.</a:t>
+              <a:t>Problem - Capturing Peaks</a:t>
             </a:r>
-            <a:endParaRPr/>
+            <a:endParaRPr sz="1900">
+              <a:highlight>
+                <a:srgbClr val="FFFFFF"/>
+              </a:highlight>
+            </a:endParaRPr>
           </a:p>
           <a:p>
-            <a:pPr indent="-295275" lvl="0" marL="457200" rtl="0" algn="l">
+            <a:pPr indent="-349250" lvl="0" marL="457200" rtl="0" algn="l">
               <a:lnSpc>
                 <a:spcPct val="150000"/>
               </a:lnSpc>
@@ -20831,42 +21112,22 @@
               <a:spcAft>
                 <a:spcPts val="0"/>
               </a:spcAft>
-              <a:buSzPct val="70945"/>
+              <a:buSzPts val="1900"/>
               <a:buChar char="●"/>
             </a:pPr>
             <a:r>
-              <a:rPr lang="en-US" sz="1600">
+              <a:rPr lang="en-US" sz="1900">
                 <a:highlight>
                   <a:srgbClr val="FFFFFF"/>
                 </a:highlight>
               </a:rPr>
-              <a:t>The model tends to underpredict the highest volatility spikes, which are critical events in financial markets.</a:t>
+              <a:t>Some lag between predicted and actual values</a:t>
             </a:r>
-            <a:endParaRPr/>
-          </a:p>
-          <a:p>
-            <a:pPr indent="-295275" lvl="0" marL="457200" rtl="0" algn="l">
-              <a:lnSpc>
-                <a:spcPct val="150000"/>
-              </a:lnSpc>
-              <a:spcBef>
-                <a:spcPts val="0"/>
-              </a:spcBef>
-              <a:spcAft>
-                <a:spcPts val="0"/>
-              </a:spcAft>
-              <a:buSzPct val="70945"/>
-              <a:buChar char="●"/>
-            </a:pPr>
-            <a:r>
-              <a:rPr lang="en-US" sz="1600">
-                <a:highlight>
-                  <a:srgbClr val="FFFFFF"/>
-                </a:highlight>
-              </a:rPr>
-              <a:t>After the peak in early 2020, which likely corresponds to the market reaction to the COVID-19 pandemic, both the actual and predicted volatility values trend downward, with the predicted values closely following the actual trend but with some lag and less pronounced movements</a:t>
-            </a:r>
-            <a:endParaRPr sz="1600"/>
+            <a:endParaRPr sz="1900">
+              <a:highlight>
+                <a:srgbClr val="FFFFFF"/>
+              </a:highlight>
+            </a:endParaRPr>
           </a:p>
         </p:txBody>
       </p:sp>
@@ -20992,89 +21253,49 @@
           </a:ln>
         </p:spPr>
         <p:txBody>
-          <a:bodyPr anchorCtr="0" anchor="t" bIns="45700" lIns="91425" spcFirstLastPara="1" rIns="91425" wrap="square" tIns="45700">
+          <a:bodyPr anchorCtr="0" anchor="ctr" bIns="45700" lIns="91425" spcFirstLastPara="1" rIns="91425" wrap="square" tIns="45700">
             <a:normAutofit/>
           </a:bodyPr>
           <a:lstStyle/>
           <a:p>
-            <a:pPr indent="-295275" lvl="0" marL="457200" rtl="0" algn="l">
-              <a:lnSpc>
-                <a:spcPct val="150000"/>
-              </a:lnSpc>
-              <a:spcBef>
-                <a:spcPts val="1100"/>
-              </a:spcBef>
-              <a:spcAft>
-                <a:spcPts val="0"/>
-              </a:spcAft>
-              <a:buSzPts val="1050"/>
+            <a:pPr indent="-336550" lvl="0" marL="457200" rtl="0" algn="l">
+              <a:lnSpc>
+                <a:spcPct val="140000"/>
+              </a:lnSpc>
+              <a:spcBef>
+                <a:spcPts val="0"/>
+              </a:spcBef>
+              <a:spcAft>
+                <a:spcPts val="0"/>
+              </a:spcAft>
+              <a:buSzPts val="1700"/>
               <a:buChar char="●"/>
             </a:pPr>
             <a:r>
-              <a:rPr lang="en-US" sz="1400">
-                <a:highlight>
-                  <a:srgbClr val="FFFFFF"/>
-                </a:highlight>
-              </a:rPr>
-              <a:t>The model captures the general trends in the data quite well. </a:t>
+              <a:rPr lang="en-US" sz="1700"/>
+              <a:t>Model does not capture the sharp rise and subsequent fall in volatility</a:t>
             </a:r>
-            <a:endParaRPr sz="1400">
-              <a:highlight>
-                <a:srgbClr val="FFFFFF"/>
-              </a:highlight>
-            </a:endParaRPr>
+            <a:endParaRPr sz="1700"/>
           </a:p>
           <a:p>
-            <a:pPr indent="-295275" lvl="0" marL="457200" rtl="0" algn="l">
-              <a:lnSpc>
-                <a:spcPct val="150000"/>
-              </a:lnSpc>
-              <a:spcBef>
-                <a:spcPts val="0"/>
-              </a:spcBef>
-              <a:spcAft>
-                <a:spcPts val="0"/>
-              </a:spcAft>
-              <a:buSzPts val="1050"/>
+            <a:pPr indent="-336550" lvl="0" marL="457200" rtl="0" algn="l">
+              <a:lnSpc>
+                <a:spcPct val="140000"/>
+              </a:lnSpc>
+              <a:spcBef>
+                <a:spcPts val="0"/>
+              </a:spcBef>
+              <a:spcAft>
+                <a:spcPts val="0"/>
+              </a:spcAft>
+              <a:buSzPts val="1700"/>
               <a:buChar char="●"/>
             </a:pPr>
             <a:r>
-              <a:rPr lang="en-US" sz="1400">
-                <a:highlight>
-                  <a:srgbClr val="FFFFFF"/>
-                </a:highlight>
-              </a:rPr>
-              <a:t>There are, however, noticeable periods where the model's predictions diverge from the actual values. This is particularly evident around the peak, where the model does not capture the sharp rise and subsequent fall in volatility.</a:t>
+              <a:rPr lang="en-US" sz="1700"/>
+              <a:t>Model doesn’t capture the finer fluctuations accurately</a:t>
             </a:r>
-            <a:endParaRPr sz="1400">
-              <a:highlight>
-                <a:srgbClr val="FFFFFF"/>
-              </a:highlight>
-            </a:endParaRPr>
-          </a:p>
-          <a:p>
-            <a:pPr indent="-295275" lvl="0" marL="457200" rtl="0" algn="l">
-              <a:lnSpc>
-                <a:spcPct val="150000"/>
-              </a:lnSpc>
-              <a:spcBef>
-                <a:spcPts val="0"/>
-              </a:spcBef>
-              <a:spcAft>
-                <a:spcPts val="0"/>
-              </a:spcAft>
-              <a:buSzPts val="1050"/>
-              <a:buChar char="●"/>
-            </a:pPr>
-            <a:r>
-              <a:rPr lang="en-US" sz="1400">
-                <a:highlight>
-                  <a:srgbClr val="FFFFFF"/>
-                </a:highlight>
-              </a:rPr>
-              <a:t>Post the peak period, the predicted values tend to follow the actual trend but do not capture the finer fluctuations accurately. This could indicate that the model may be smoothing over some of the volatility.</a:t>
-            </a:r>
-            <a:endParaRPr sz="4000"/>
+            <a:endParaRPr sz="1700"/>
           </a:p>
         </p:txBody>
       </p:sp>

</xml_diff>